<commit_message>
Initial commit for the Java session
</commit_message>
<xml_diff>
--- a/S02/03BACKE25 Session 02.pptx
+++ b/S02/03BACKE25 Session 02.pptx
@@ -11192,8 +11192,8 @@
         </p:nvSpPr>
         <p:spPr bwMode="auto">
           <a:xfrm>
-            <a:off x="755374" y="1536672"/>
-            <a:ext cx="15088040" cy="4196020"/>
+            <a:off x="755374" y="1328923"/>
+            <a:ext cx="10455965" cy="4611519"/>
           </a:xfrm>
           <a:prstGeom prst="rect">
             <a:avLst/>

</xml_diff>

<commit_message>
commit for the Java session 02
</commit_message>
<xml_diff>
--- a/S02/03BACKE25 Session 02.pptx
+++ b/S02/03BACKE25 Session 02.pptx
@@ -5,10 +5,10 @@
     <p:sldMasterId id="2147483648" r:id="rId4"/>
   </p:sldMasterIdLst>
   <p:notesMasterIdLst>
-    <p:notesMasterId r:id="rId16"/>
+    <p:notesMasterId r:id="rId17"/>
   </p:notesMasterIdLst>
   <p:handoutMasterIdLst>
-    <p:handoutMasterId r:id="rId17"/>
+    <p:handoutMasterId r:id="rId18"/>
   </p:handoutMasterIdLst>
   <p:sldIdLst>
     <p:sldId id="256" r:id="rId5"/>
@@ -21,7 +21,8 @@
     <p:sldId id="277" r:id="rId12"/>
     <p:sldId id="278" r:id="rId13"/>
     <p:sldId id="279" r:id="rId14"/>
-    <p:sldId id="271" r:id="rId15"/>
+    <p:sldId id="280" r:id="rId15"/>
+    <p:sldId id="271" r:id="rId16"/>
   </p:sldIdLst>
   <p:sldSz cx="12192000" cy="6858000"/>
   <p:notesSz cx="6858000" cy="9144000"/>
@@ -1010,7 +1011,7 @@
           <a:p>
             <a:fld id="{22289C57-55D7-40A4-A101-E74FAC7A092B}" type="slidenum">
               <a:rPr lang="en-US" smtClean="0"/>
-              <a:t>11</a:t>
+              <a:t>12</a:t>
             </a:fld>
             <a:endParaRPr lang="en-US" dirty="0"/>
           </a:p>
@@ -7063,6 +7064,123 @@
           <p:cNvPr id="2" name="Title 1">
             <a:extLst>
               <a:ext uri="{FF2B5EF4-FFF2-40B4-BE49-F238E27FC236}">
+                <a16:creationId xmlns:a16="http://schemas.microsoft.com/office/drawing/2014/main" id="{30FD296A-D1F6-75FC-F19B-8C162E4B9529}"/>
+              </a:ext>
+            </a:extLst>
+          </p:cNvPr>
+          <p:cNvSpPr>
+            <a:spLocks noGrp="1"/>
+          </p:cNvSpPr>
+          <p:nvPr>
+            <p:ph type="title"/>
+          </p:nvPr>
+        </p:nvSpPr>
+        <p:spPr/>
+        <p:txBody>
+          <a:bodyPr/>
+          <a:lstStyle/>
+          <a:p>
+            <a:r>
+              <a:rPr lang="en-US" dirty="0" err="1"/>
+              <a:t>Quizz</a:t>
+            </a:r>
+            <a:endParaRPr lang="en-US" dirty="0"/>
+          </a:p>
+        </p:txBody>
+      </p:sp>
+      <p:sp>
+        <p:nvSpPr>
+          <p:cNvPr id="3" name="Content Placeholder 2">
+            <a:extLst>
+              <a:ext uri="{FF2B5EF4-FFF2-40B4-BE49-F238E27FC236}">
+                <a16:creationId xmlns:a16="http://schemas.microsoft.com/office/drawing/2014/main" id="{8621D142-7AFE-6680-C212-0237C74666C5}"/>
+              </a:ext>
+            </a:extLst>
+          </p:cNvPr>
+          <p:cNvSpPr>
+            <a:spLocks noGrp="1"/>
+          </p:cNvSpPr>
+          <p:nvPr>
+            <p:ph sz="half" idx="2"/>
+          </p:nvPr>
+        </p:nvSpPr>
+        <p:spPr/>
+        <p:txBody>
+          <a:bodyPr/>
+          <a:lstStyle/>
+          <a:p>
+            <a:r>
+              <a:rPr lang="en-US" dirty="0"/>
+              <a:t>https://wayground.com/join?gc=12730978&amp;source=liveDashboard</a:t>
+            </a:r>
+          </a:p>
+        </p:txBody>
+      </p:sp>
+      <p:sp>
+        <p:nvSpPr>
+          <p:cNvPr id="4" name="Slide Number Placeholder 3">
+            <a:extLst>
+              <a:ext uri="{FF2B5EF4-FFF2-40B4-BE49-F238E27FC236}">
+                <a16:creationId xmlns:a16="http://schemas.microsoft.com/office/drawing/2014/main" id="{CC85F768-2111-A72F-1860-0F6722E409AD}"/>
+              </a:ext>
+            </a:extLst>
+          </p:cNvPr>
+          <p:cNvSpPr>
+            <a:spLocks noGrp="1"/>
+          </p:cNvSpPr>
+          <p:nvPr>
+            <p:ph type="sldNum" sz="quarter" idx="12"/>
+          </p:nvPr>
+        </p:nvSpPr>
+        <p:spPr/>
+        <p:txBody>
+          <a:bodyPr/>
+          <a:lstStyle/>
+          <a:p>
+            <a:fld id="{A49DFD55-3C28-40EF-9E31-A92D2E4017FF}" type="slidenum">
+              <a:rPr lang="en-US" smtClean="0"/>
+              <a:pPr/>
+              <a:t>11</a:t>
+            </a:fld>
+            <a:endParaRPr lang="en-US" dirty="0"/>
+          </a:p>
+        </p:txBody>
+      </p:sp>
+    </p:spTree>
+    <p:extLst>
+      <p:ext uri="{BB962C8B-B14F-4D97-AF65-F5344CB8AC3E}">
+        <p14:creationId xmlns:p14="http://schemas.microsoft.com/office/powerpoint/2010/main" val="3681740786"/>
+      </p:ext>
+    </p:extLst>
+  </p:cSld>
+  <p:clrMapOvr>
+    <a:masterClrMapping/>
+  </p:clrMapOvr>
+</p:sld>
+</file>
+
+<file path=ppt/slides/slide12.xml><?xml version="1.0" encoding="utf-8"?>
+<p:sld xmlns:a="http://schemas.openxmlformats.org/drawingml/2006/main" xmlns:r="http://schemas.openxmlformats.org/officeDocument/2006/relationships" xmlns:p="http://schemas.openxmlformats.org/presentationml/2006/main">
+  <p:cSld>
+    <p:spTree>
+      <p:nvGrpSpPr>
+        <p:cNvPr id="1" name=""/>
+        <p:cNvGrpSpPr/>
+        <p:nvPr/>
+      </p:nvGrpSpPr>
+      <p:grpSpPr>
+        <a:xfrm>
+          <a:off x="0" y="0"/>
+          <a:ext cx="0" cy="0"/>
+          <a:chOff x="0" y="0"/>
+          <a:chExt cx="0" cy="0"/>
+        </a:xfrm>
+      </p:grpSpPr>
+      <p:sp>
+        <p:nvSpPr>
+          <p:cNvPr id="2" name="Title 1">
+            <a:extLst>
+              <a:ext uri="{FF2B5EF4-FFF2-40B4-BE49-F238E27FC236}">
                 <a16:creationId xmlns:a16="http://schemas.microsoft.com/office/drawing/2014/main" id="{8BDF1EDE-5423-435C-B149-87AB1BC22B83}"/>
               </a:ext>
             </a:extLst>
@@ -7120,7 +7238,7 @@
             <a:fld id="{A49DFD55-3C28-40EF-9E31-A92D2E4017FF}" type="slidenum">
               <a:rPr lang="en-US" smtClean="0"/>
               <a:pPr/>
-              <a:t>11</a:t>
+              <a:t>12</a:t>
             </a:fld>
             <a:endParaRPr lang="en-US" dirty="0"/>
           </a:p>

</xml_diff>